<commit_message>
Update Sparta Simulation Project Presentation.pptx
</commit_message>
<xml_diff>
--- a/Sparta Simulation Project Presentation.pptx
+++ b/Sparta Simulation Project Presentation.pptx
@@ -115,6 +115,11 @@
       </a:defRPr>
     </a:lvl9pPr>
   </p:defaultTextStyle>
+  <p:extLst>
+    <p:ext uri="{EFAFB233-063F-42B5-8137-9DF3F51BA10A}">
+      <p15:sldGuideLst xmlns:p15="http://schemas.microsoft.com/office/powerpoint/2012/main"/>
+    </p:ext>
+  </p:extLst>
 </p:presentation>
 </file>
 
@@ -6254,6 +6259,467 @@
   <p:cSld>
     <p:bg>
       <p:bgPr>
+        <a:solidFill>
+          <a:schemeClr val="bg1"/>
+        </a:solidFill>
+        <a:effectLst/>
+      </p:bgPr>
+    </p:bg>
+    <p:spTree>
+      <p:nvGrpSpPr>
+        <p:cNvPr id="1" name=""/>
+        <p:cNvGrpSpPr/>
+        <p:nvPr/>
+      </p:nvGrpSpPr>
+      <p:grpSpPr>
+        <a:xfrm>
+          <a:off x="0" y="0"/>
+          <a:ext cx="0" cy="0"/>
+          <a:chOff x="0" y="0"/>
+          <a:chExt cx="0" cy="0"/>
+        </a:xfrm>
+      </p:grpSpPr>
+      <p:sp>
+        <p:nvSpPr>
+          <p:cNvPr id="17" name="Rectangle 14">
+            <a:extLst>
+              <a:ext uri="{FF2B5EF4-FFF2-40B4-BE49-F238E27FC236}">
+                <a16:creationId xmlns:a16="http://schemas.microsoft.com/office/drawing/2014/main" id="{95CB840F-8E41-4CA5-B79B-25CC80AD234A}"/>
+              </a:ext>
+              <a:ext uri="{C183D7F6-B498-43B3-948B-1728B52AA6E4}">
+                <adec:decorative xmlns:adec="http://schemas.microsoft.com/office/drawing/2017/decorative" val="1"/>
+              </a:ext>
+            </a:extLst>
+          </p:cNvPr>
+          <p:cNvSpPr>
+            <a:spLocks noGrp="1" noRot="1" noChangeAspect="1" noMove="1" noResize="1" noEditPoints="1" noAdjustHandles="1" noChangeArrowheads="1" noChangeShapeType="1" noTextEdit="1"/>
+          </p:cNvSpPr>
+          <p:nvPr>
+            <p:extLst>
+              <p:ext uri="{386F3935-93C4-4BCD-93E2-E3B085C9AB24}">
+                <p16:designElem xmlns:p16="http://schemas.microsoft.com/office/powerpoint/2015/main" val="1"/>
+              </p:ext>
+            </p:extLst>
+          </p:nvPr>
+        </p:nvSpPr>
+        <p:spPr>
+          <a:xfrm>
+            <a:off x="0" y="0"/>
+            <a:ext cx="12192000" cy="6858000"/>
+          </a:xfrm>
+          <a:prstGeom prst="rect">
+            <a:avLst/>
+          </a:prstGeom>
+          <a:ln>
+            <a:noFill/>
+          </a:ln>
+        </p:spPr>
+        <p:style>
+          <a:lnRef idx="2">
+            <a:schemeClr val="accent1">
+              <a:shade val="50000"/>
+            </a:schemeClr>
+          </a:lnRef>
+          <a:fillRef idx="1003">
+            <a:schemeClr val="dk2"/>
+          </a:fillRef>
+          <a:effectRef idx="0">
+            <a:schemeClr val="accent1"/>
+          </a:effectRef>
+          <a:fontRef idx="minor">
+            <a:schemeClr val="lt1"/>
+          </a:fontRef>
+        </p:style>
+        <p:txBody>
+          <a:bodyPr rtlCol="0" anchor="ctr"/>
+          <a:lstStyle/>
+          <a:p>
+            <a:pPr algn="ctr"/>
+            <a:endParaRPr lang="en-US"/>
+          </a:p>
+        </p:txBody>
+      </p:sp>
+      <p:sp>
+        <p:nvSpPr>
+          <p:cNvPr id="2" name="Title 1">
+            <a:extLst>
+              <a:ext uri="{FF2B5EF4-FFF2-40B4-BE49-F238E27FC236}">
+                <a16:creationId xmlns:a16="http://schemas.microsoft.com/office/drawing/2014/main" id="{331428AD-72F4-4F1B-9735-19B145FD4940}"/>
+              </a:ext>
+            </a:extLst>
+          </p:cNvPr>
+          <p:cNvSpPr>
+            <a:spLocks noGrp="1"/>
+          </p:cNvSpPr>
+          <p:nvPr>
+            <p:ph type="title"/>
+          </p:nvPr>
+        </p:nvSpPr>
+        <p:spPr>
+          <a:xfrm>
+            <a:off x="913795" y="609600"/>
+            <a:ext cx="3078749" cy="970450"/>
+          </a:xfrm>
+        </p:spPr>
+        <p:txBody>
+          <a:bodyPr anchor="b">
+            <a:normAutofit/>
+          </a:bodyPr>
+          <a:lstStyle/>
+          <a:p>
+            <a:pPr algn="l"/>
+            <a:r>
+              <a:rPr lang="en-GB" sz="2800">
+                <a:ln>
+                  <a:solidFill>
+                    <a:srgbClr val="404040">
+                      <a:alpha val="10000"/>
+                    </a:srgbClr>
+                  </a:solidFill>
+                </a:ln>
+                <a:solidFill>
+                  <a:srgbClr val="DADADA"/>
+                </a:solidFill>
+              </a:rPr>
+              <a:t>Local Multiplayer</a:t>
+            </a:r>
+            <a:br>
+              <a:rPr lang="en-GB" sz="2800">
+                <a:ln>
+                  <a:solidFill>
+                    <a:srgbClr val="404040">
+                      <a:alpha val="10000"/>
+                    </a:srgbClr>
+                  </a:solidFill>
+                </a:ln>
+                <a:solidFill>
+                  <a:srgbClr val="DADADA"/>
+                </a:solidFill>
+              </a:rPr>
+            </a:br>
+            <a:r>
+              <a:rPr lang="en-GB" sz="2800">
+                <a:ln>
+                  <a:solidFill>
+                    <a:srgbClr val="404040">
+                      <a:alpha val="10000"/>
+                    </a:srgbClr>
+                  </a:solidFill>
+                </a:ln>
+                <a:solidFill>
+                  <a:srgbClr val="DADADA"/>
+                </a:solidFill>
+              </a:rPr>
+              <a:t>Mini Game</a:t>
+            </a:r>
+          </a:p>
+        </p:txBody>
+      </p:sp>
+      <p:sp>
+        <p:nvSpPr>
+          <p:cNvPr id="3" name="Content Placeholder 2">
+            <a:extLst>
+              <a:ext uri="{FF2B5EF4-FFF2-40B4-BE49-F238E27FC236}">
+                <a16:creationId xmlns:a16="http://schemas.microsoft.com/office/drawing/2014/main" id="{EE7E2B08-5721-452D-8D99-517087B69B50}"/>
+              </a:ext>
+            </a:extLst>
+          </p:cNvPr>
+          <p:cNvSpPr>
+            <a:spLocks noGrp="1"/>
+          </p:cNvSpPr>
+          <p:nvPr>
+            <p:ph idx="1"/>
+          </p:nvPr>
+        </p:nvSpPr>
+        <p:spPr>
+          <a:xfrm>
+            <a:off x="913795" y="1732449"/>
+            <a:ext cx="3078749" cy="4482084"/>
+          </a:xfrm>
+        </p:spPr>
+        <p:txBody>
+          <a:bodyPr anchor="t">
+            <a:normAutofit/>
+          </a:bodyPr>
+          <a:lstStyle/>
+          <a:p>
+            <a:r>
+              <a:rPr lang="en-GB" sz="1600" dirty="0">
+                <a:ln>
+                  <a:solidFill>
+                    <a:srgbClr val="404040">
+                      <a:alpha val="10000"/>
+                    </a:srgbClr>
+                  </a:solidFill>
+                </a:ln>
+                <a:solidFill>
+                  <a:srgbClr val="DADADA"/>
+                </a:solidFill>
+              </a:rPr>
+              <a:t>Mini game uses a second Camera</a:t>
+            </a:r>
+          </a:p>
+          <a:p>
+            <a:endParaRPr lang="en-GB" sz="1600" dirty="0">
+              <a:ln>
+                <a:solidFill>
+                  <a:srgbClr val="404040">
+                    <a:alpha val="10000"/>
+                  </a:srgbClr>
+                </a:solidFill>
+              </a:ln>
+              <a:solidFill>
+                <a:srgbClr val="DADADA"/>
+              </a:solidFill>
+            </a:endParaRPr>
+          </a:p>
+          <a:p>
+            <a:r>
+              <a:rPr lang="en-GB" sz="1600" dirty="0">
+                <a:ln>
+                  <a:solidFill>
+                    <a:srgbClr val="404040">
+                      <a:alpha val="10000"/>
+                    </a:srgbClr>
+                  </a:solidFill>
+                </a:ln>
+                <a:solidFill>
+                  <a:srgbClr val="DADADA"/>
+                </a:solidFill>
+              </a:rPr>
+              <a:t>Renders live texture</a:t>
+            </a:r>
+          </a:p>
+          <a:p>
+            <a:endParaRPr lang="en-GB" sz="1600" dirty="0">
+              <a:ln>
+                <a:solidFill>
+                  <a:srgbClr val="404040">
+                    <a:alpha val="10000"/>
+                  </a:srgbClr>
+                </a:solidFill>
+              </a:ln>
+              <a:solidFill>
+                <a:srgbClr val="DADADA"/>
+              </a:solidFill>
+            </a:endParaRPr>
+          </a:p>
+          <a:p>
+            <a:r>
+              <a:rPr lang="en-GB" sz="1600" dirty="0">
+                <a:ln>
+                  <a:solidFill>
+                    <a:srgbClr val="404040">
+                      <a:alpha val="10000"/>
+                    </a:srgbClr>
+                  </a:solidFill>
+                </a:ln>
+                <a:solidFill>
+                  <a:srgbClr val="DADADA"/>
+                </a:solidFill>
+              </a:rPr>
+              <a:t>Ball movement:</a:t>
+            </a:r>
+          </a:p>
+          <a:p>
+            <a:pPr lvl="1"/>
+            <a:r>
+              <a:rPr lang="en-GB" sz="1400" dirty="0">
+                <a:ln>
+                  <a:solidFill>
+                    <a:srgbClr val="404040">
+                      <a:alpha val="10000"/>
+                    </a:srgbClr>
+                  </a:solidFill>
+                </a:ln>
+                <a:solidFill>
+                  <a:srgbClr val="DADADA"/>
+                </a:solidFill>
+              </a:rPr>
+              <a:t>Uses a Vector(1f,1f,0f)</a:t>
+            </a:r>
+          </a:p>
+          <a:p>
+            <a:pPr lvl="1"/>
+            <a:r>
+              <a:rPr lang="en-GB" sz="1400" dirty="0">
+                <a:ln>
+                  <a:solidFill>
+                    <a:srgbClr val="404040">
+                      <a:alpha val="10000"/>
+                    </a:srgbClr>
+                  </a:solidFill>
+                </a:ln>
+                <a:solidFill>
+                  <a:srgbClr val="DADADA"/>
+                </a:solidFill>
+              </a:rPr>
+              <a:t>if(collisions)</a:t>
+            </a:r>
+          </a:p>
+        </p:txBody>
+      </p:sp>
+      <p:pic>
+        <p:nvPicPr>
+          <p:cNvPr id="4" name="Picture 3" descr="A screen shot of a computer&#10;&#10;Description automatically generated">
+            <a:extLst>
+              <a:ext uri="{FF2B5EF4-FFF2-40B4-BE49-F238E27FC236}">
+                <a16:creationId xmlns:a16="http://schemas.microsoft.com/office/drawing/2014/main" id="{1A394F9F-B82C-4F4D-810C-7DC40764F3A8}"/>
+              </a:ext>
+            </a:extLst>
+          </p:cNvPr>
+          <p:cNvPicPr>
+            <a:picLocks noChangeAspect="1"/>
+          </p:cNvPicPr>
+          <p:nvPr/>
+        </p:nvPicPr>
+        <p:blipFill>
+          <a:blip r:embed="rId2"/>
+          <a:stretch>
+            <a:fillRect/>
+          </a:stretch>
+        </p:blipFill>
+        <p:spPr>
+          <a:xfrm>
+            <a:off x="4906339" y="1245378"/>
+            <a:ext cx="6642193" cy="4367242"/>
+          </a:xfrm>
+          <a:prstGeom prst="rect">
+            <a:avLst/>
+          </a:prstGeom>
+        </p:spPr>
+      </p:pic>
+      <p:pic>
+        <p:nvPicPr>
+          <p:cNvPr id="5" name="Picture 4">
+            <a:extLst>
+              <a:ext uri="{FF2B5EF4-FFF2-40B4-BE49-F238E27FC236}">
+                <a16:creationId xmlns:a16="http://schemas.microsoft.com/office/drawing/2014/main" id="{ED808F63-1E91-4E0C-9B57-A3DA1795B418}"/>
+              </a:ext>
+            </a:extLst>
+          </p:cNvPr>
+          <p:cNvPicPr>
+            <a:picLocks noChangeAspect="1"/>
+          </p:cNvPicPr>
+          <p:nvPr/>
+        </p:nvPicPr>
+        <p:blipFill>
+          <a:blip r:embed="rId3"/>
+          <a:stretch>
+            <a:fillRect/>
+          </a:stretch>
+        </p:blipFill>
+        <p:spPr>
+          <a:xfrm>
+            <a:off x="1329751" y="488122"/>
+            <a:ext cx="9532498" cy="5881754"/>
+          </a:xfrm>
+          <a:prstGeom prst="rect">
+            <a:avLst/>
+          </a:prstGeom>
+        </p:spPr>
+      </p:pic>
+    </p:spTree>
+    <p:extLst>
+      <p:ext uri="{BB962C8B-B14F-4D97-AF65-F5344CB8AC3E}">
+        <p14:creationId xmlns:p14="http://schemas.microsoft.com/office/powerpoint/2010/main" val="3985093766"/>
+      </p:ext>
+    </p:extLst>
+  </p:cSld>
+  <p:clrMapOvr>
+    <a:overrideClrMapping bg1="lt1" tx1="dk1" bg2="lt2" tx2="dk2" accent1="accent1" accent2="accent2" accent3="accent3" accent4="accent4" accent5="accent5" accent6="accent6" hlink="hlink" folHlink="folHlink"/>
+  </p:clrMapOvr>
+  <p:timing>
+    <p:tnLst>
+      <p:par>
+        <p:cTn id="1" dur="indefinite" restart="never" nodeType="tmRoot">
+          <p:childTnLst>
+            <p:seq concurrent="1" nextAc="seek">
+              <p:cTn id="2" dur="indefinite" nodeType="mainSeq">
+                <p:childTnLst>
+                  <p:par>
+                    <p:cTn id="3" fill="hold">
+                      <p:stCondLst>
+                        <p:cond delay="indefinite"/>
+                      </p:stCondLst>
+                      <p:childTnLst>
+                        <p:par>
+                          <p:cTn id="4" fill="hold">
+                            <p:stCondLst>
+                              <p:cond delay="0"/>
+                            </p:stCondLst>
+                            <p:childTnLst>
+                              <p:par>
+                                <p:cTn id="5" presetID="10" presetClass="entr" presetSubtype="0" fill="hold" nodeType="clickEffect">
+                                  <p:stCondLst>
+                                    <p:cond delay="0"/>
+                                  </p:stCondLst>
+                                  <p:childTnLst>
+                                    <p:set>
+                                      <p:cBhvr>
+                                        <p:cTn id="6" dur="1" fill="hold">
+                                          <p:stCondLst>
+                                            <p:cond delay="0"/>
+                                          </p:stCondLst>
+                                        </p:cTn>
+                                        <p:tgtEl>
+                                          <p:spTgt spid="5"/>
+                                        </p:tgtEl>
+                                        <p:attrNameLst>
+                                          <p:attrName>style.visibility</p:attrName>
+                                        </p:attrNameLst>
+                                      </p:cBhvr>
+                                      <p:to>
+                                        <p:strVal val="visible"/>
+                                      </p:to>
+                                    </p:set>
+                                    <p:animEffect transition="in" filter="fade">
+                                      <p:cBhvr>
+                                        <p:cTn id="7" dur="500"/>
+                                        <p:tgtEl>
+                                          <p:spTgt spid="5"/>
+                                        </p:tgtEl>
+                                      </p:cBhvr>
+                                    </p:animEffect>
+                                  </p:childTnLst>
+                                </p:cTn>
+                              </p:par>
+                            </p:childTnLst>
+                          </p:cTn>
+                        </p:par>
+                      </p:childTnLst>
+                    </p:cTn>
+                  </p:par>
+                </p:childTnLst>
+              </p:cTn>
+              <p:prevCondLst>
+                <p:cond evt="onPrev" delay="0">
+                  <p:tgtEl>
+                    <p:sldTgt/>
+                  </p:tgtEl>
+                </p:cond>
+              </p:prevCondLst>
+              <p:nextCondLst>
+                <p:cond evt="onNext" delay="0">
+                  <p:tgtEl>
+                    <p:sldTgt/>
+                  </p:tgtEl>
+                </p:cond>
+              </p:nextCondLst>
+            </p:seq>
+          </p:childTnLst>
+        </p:cTn>
+      </p:par>
+    </p:tnLst>
+  </p:timing>
+</p:sld>
+</file>
+
+<file path=ppt/slides/slide11.xml><?xml version="1.0" encoding="utf-8"?>
+<p:sld xmlns:a="http://schemas.openxmlformats.org/drawingml/2006/main" xmlns:r="http://schemas.openxmlformats.org/officeDocument/2006/relationships" xmlns:p="http://schemas.openxmlformats.org/presentationml/2006/main">
+  <p:cSld>
+    <p:bg>
+      <p:bgPr>
         <a:blipFill rotWithShape="1">
           <a:blip r:embed="rId2">
             <a:duotone>
@@ -6886,59 +7352,45 @@
             <a:pPr algn="l"/>
             <a:r>
               <a:rPr lang="en-GB" sz="4800" dirty="0"/>
-              <a:t>Local Multiplayer</a:t>
+              <a:t>Other Code Highlights</a:t>
             </a:r>
-            <a:br>
-              <a:rPr lang="en-GB" sz="4800" dirty="0"/>
-            </a:br>
-            <a:r>
-              <a:rPr lang="en-GB" sz="4800" dirty="0"/>
-              <a:t>Mini Game</a:t>
-            </a:r>
-          </a:p>
-        </p:txBody>
-      </p:sp>
-      <p:sp>
-        <p:nvSpPr>
-          <p:cNvPr id="3" name="Content Placeholder 2">
+          </a:p>
+        </p:txBody>
+      </p:sp>
+      <p:pic>
+        <p:nvPicPr>
+          <p:cNvPr id="4" name="Picture 3">
             <a:extLst>
               <a:ext uri="{FF2B5EF4-FFF2-40B4-BE49-F238E27FC236}">
-                <a16:creationId xmlns:a16="http://schemas.microsoft.com/office/drawing/2014/main" id="{EE7E2B08-5721-452D-8D99-517087B69B50}"/>
+                <a16:creationId xmlns:a16="http://schemas.microsoft.com/office/drawing/2014/main" id="{D8772CDA-2996-49FC-9061-81955D209A17}"/>
               </a:ext>
             </a:extLst>
           </p:cNvPr>
-          <p:cNvSpPr>
-            <a:spLocks noGrp="1"/>
-          </p:cNvSpPr>
-          <p:nvPr>
-            <p:ph idx="1"/>
-          </p:nvPr>
-        </p:nvSpPr>
+          <p:cNvPicPr>
+            <a:picLocks noChangeAspect="1"/>
+          </p:cNvPicPr>
+          <p:nvPr/>
+        </p:nvPicPr>
+        <p:blipFill>
+          <a:blip r:embed="rId3"/>
+          <a:stretch>
+            <a:fillRect/>
+          </a:stretch>
+        </p:blipFill>
         <p:spPr>
           <a:xfrm>
-            <a:off x="6498769" y="1118809"/>
-            <a:ext cx="5049763" cy="4747681"/>
+            <a:off x="676275" y="1676399"/>
+            <a:ext cx="10839450" cy="3505200"/>
           </a:xfrm>
-          <a:effectLst/>
+          <a:prstGeom prst="rect">
+            <a:avLst/>
+          </a:prstGeom>
         </p:spPr>
-        <p:txBody>
-          <a:bodyPr anchor="ctr">
-            <a:normAutofit/>
-          </a:bodyPr>
-          <a:lstStyle/>
-          <a:p>
-            <a:endParaRPr lang="en-GB" dirty="0">
-              <a:solidFill>
-                <a:schemeClr val="tx1"/>
-              </a:solidFill>
-            </a:endParaRPr>
-          </a:p>
-        </p:txBody>
-      </p:sp>
+      </p:pic>
     </p:spTree>
     <p:extLst>
       <p:ext uri="{BB962C8B-B14F-4D97-AF65-F5344CB8AC3E}">
-        <p14:creationId xmlns:p14="http://schemas.microsoft.com/office/powerpoint/2010/main" val="3985093766"/>
+        <p14:creationId xmlns:p14="http://schemas.microsoft.com/office/powerpoint/2010/main" val="2842819927"/>
       </p:ext>
     </p:extLst>
   </p:cSld>
@@ -6948,7 +7400,7 @@
 </p:sld>
 </file>
 
-<file path=ppt/slides/slide11.xml><?xml version="1.0" encoding="utf-8"?>
+<file path=ppt/slides/slide12.xml><?xml version="1.0" encoding="utf-8"?>
 <p:sld xmlns:a="http://schemas.openxmlformats.org/drawingml/2006/main" xmlns:r="http://schemas.openxmlformats.org/officeDocument/2006/relationships" xmlns:p="http://schemas.openxmlformats.org/presentationml/2006/main">
   <p:cSld>
     <p:bg>
@@ -7585,697 +8037,8 @@
             <a:pPr algn="l"/>
             <a:r>
               <a:rPr lang="en-GB" sz="4800" dirty="0"/>
-              <a:t>Code Highlights</a:t>
+              <a:t>Questions?</a:t>
             </a:r>
-          </a:p>
-        </p:txBody>
-      </p:sp>
-      <p:sp>
-        <p:nvSpPr>
-          <p:cNvPr id="3" name="Content Placeholder 2">
-            <a:extLst>
-              <a:ext uri="{FF2B5EF4-FFF2-40B4-BE49-F238E27FC236}">
-                <a16:creationId xmlns:a16="http://schemas.microsoft.com/office/drawing/2014/main" id="{EE7E2B08-5721-452D-8D99-517087B69B50}"/>
-              </a:ext>
-            </a:extLst>
-          </p:cNvPr>
-          <p:cNvSpPr>
-            <a:spLocks noGrp="1"/>
-          </p:cNvSpPr>
-          <p:nvPr>
-            <p:ph idx="1"/>
-          </p:nvPr>
-        </p:nvSpPr>
-        <p:spPr>
-          <a:xfrm>
-            <a:off x="6498769" y="1118809"/>
-            <a:ext cx="5049763" cy="4747681"/>
-          </a:xfrm>
-          <a:effectLst/>
-        </p:spPr>
-        <p:txBody>
-          <a:bodyPr anchor="ctr">
-            <a:normAutofit/>
-          </a:bodyPr>
-          <a:lstStyle/>
-          <a:p>
-            <a:endParaRPr lang="en-GB" dirty="0">
-              <a:solidFill>
-                <a:schemeClr val="tx1"/>
-              </a:solidFill>
-            </a:endParaRPr>
-          </a:p>
-        </p:txBody>
-      </p:sp>
-    </p:spTree>
-    <p:extLst>
-      <p:ext uri="{BB962C8B-B14F-4D97-AF65-F5344CB8AC3E}">
-        <p14:creationId xmlns:p14="http://schemas.microsoft.com/office/powerpoint/2010/main" val="2842819927"/>
-      </p:ext>
-    </p:extLst>
-  </p:cSld>
-  <p:clrMapOvr>
-    <a:masterClrMapping/>
-  </p:clrMapOvr>
-</p:sld>
-</file>
-
-<file path=ppt/slides/slide12.xml><?xml version="1.0" encoding="utf-8"?>
-<p:sld xmlns:a="http://schemas.openxmlformats.org/drawingml/2006/main" xmlns:r="http://schemas.openxmlformats.org/officeDocument/2006/relationships" xmlns:p="http://schemas.openxmlformats.org/presentationml/2006/main">
-  <p:cSld>
-    <p:bg>
-      <p:bgPr>
-        <a:blipFill rotWithShape="1">
-          <a:blip r:embed="rId2">
-            <a:duotone>
-              <a:schemeClr val="bg2">
-                <a:shade val="80000"/>
-                <a:lumMod val="80000"/>
-              </a:schemeClr>
-              <a:schemeClr val="bg2">
-                <a:tint val="98000"/>
-              </a:schemeClr>
-            </a:duotone>
-          </a:blip>
-          <a:stretch/>
-        </a:blipFill>
-        <a:effectLst/>
-      </p:bgPr>
-    </p:bg>
-    <p:spTree>
-      <p:nvGrpSpPr>
-        <p:cNvPr id="1" name=""/>
-        <p:cNvGrpSpPr/>
-        <p:nvPr/>
-      </p:nvGrpSpPr>
-      <p:grpSpPr>
-        <a:xfrm>
-          <a:off x="0" y="0"/>
-          <a:ext cx="0" cy="0"/>
-          <a:chOff x="0" y="0"/>
-          <a:chExt cx="0" cy="0"/>
-        </a:xfrm>
-      </p:grpSpPr>
-      <p:sp>
-        <p:nvSpPr>
-          <p:cNvPr id="8" name="Rectangle 7">
-            <a:extLst>
-              <a:ext uri="{FF2B5EF4-FFF2-40B4-BE49-F238E27FC236}">
-                <a16:creationId xmlns:a16="http://schemas.microsoft.com/office/drawing/2014/main" id="{AC224410-FF86-4FBB-A05E-61232D4B1368}"/>
-              </a:ext>
-              <a:ext uri="{C183D7F6-B498-43B3-948B-1728B52AA6E4}">
-                <adec:decorative xmlns:adec="http://schemas.microsoft.com/office/drawing/2017/decorative" val="1"/>
-              </a:ext>
-            </a:extLst>
-          </p:cNvPr>
-          <p:cNvSpPr>
-            <a:spLocks noGrp="1" noRot="1" noChangeAspect="1" noMove="1" noResize="1" noEditPoints="1" noAdjustHandles="1" noChangeArrowheads="1" noChangeShapeType="1" noTextEdit="1"/>
-          </p:cNvSpPr>
-          <p:nvPr>
-            <p:extLst>
-              <p:ext uri="{386F3935-93C4-4BCD-93E2-E3B085C9AB24}">
-                <p16:designElem xmlns:p16="http://schemas.microsoft.com/office/powerpoint/2015/main" val="1"/>
-              </p:ext>
-            </p:extLst>
-          </p:nvPr>
-        </p:nvSpPr>
-        <p:spPr>
-          <a:xfrm>
-            <a:off x="0" y="0"/>
-            <a:ext cx="12192000" cy="6858000"/>
-          </a:xfrm>
-          <a:prstGeom prst="rect">
-            <a:avLst/>
-          </a:prstGeom>
-          <a:solidFill>
-            <a:schemeClr val="bg2">
-              <a:lumMod val="75000"/>
-              <a:lumOff val="25000"/>
-            </a:schemeClr>
-          </a:solidFill>
-          <a:ln>
-            <a:noFill/>
-          </a:ln>
-        </p:spPr>
-        <p:style>
-          <a:lnRef idx="2">
-            <a:schemeClr val="accent1">
-              <a:shade val="50000"/>
-            </a:schemeClr>
-          </a:lnRef>
-          <a:fillRef idx="1">
-            <a:schemeClr val="accent1"/>
-          </a:fillRef>
-          <a:effectRef idx="0">
-            <a:schemeClr val="accent1"/>
-          </a:effectRef>
-          <a:fontRef idx="minor">
-            <a:schemeClr val="lt1"/>
-          </a:fontRef>
-        </p:style>
-        <p:txBody>
-          <a:bodyPr rtlCol="0" anchor="ctr"/>
-          <a:lstStyle/>
-          <a:p>
-            <a:pPr algn="ctr"/>
-            <a:endParaRPr lang="en-US"/>
-          </a:p>
-        </p:txBody>
-      </p:sp>
-      <p:sp useBgFill="1">
-        <p:nvSpPr>
-          <p:cNvPr id="10" name="Freeform: Shape 9">
-            <a:extLst>
-              <a:ext uri="{FF2B5EF4-FFF2-40B4-BE49-F238E27FC236}">
-                <a16:creationId xmlns:a16="http://schemas.microsoft.com/office/drawing/2014/main" id="{F3BDD110-869E-4A8C-9250-C7AE5C840842}"/>
-              </a:ext>
-              <a:ext uri="{C183D7F6-B498-43B3-948B-1728B52AA6E4}">
-                <adec:decorative xmlns:adec="http://schemas.microsoft.com/office/drawing/2017/decorative" val="1"/>
-              </a:ext>
-            </a:extLst>
-          </p:cNvPr>
-          <p:cNvSpPr>
-            <a:spLocks noGrp="1" noRot="1" noChangeAspect="1" noMove="1" noResize="1" noEditPoints="1" noAdjustHandles="1" noChangeArrowheads="1" noChangeShapeType="1" noTextEdit="1"/>
-          </p:cNvSpPr>
-          <p:nvPr>
-            <p:extLst>
-              <p:ext uri="{386F3935-93C4-4BCD-93E2-E3B085C9AB24}">
-                <p16:designElem xmlns:p16="http://schemas.microsoft.com/office/powerpoint/2015/main" val="1"/>
-              </p:ext>
-            </p:extLst>
-          </p:nvPr>
-        </p:nvSpPr>
-        <p:spPr>
-          <a:xfrm>
-            <a:off x="7302" y="-2"/>
-            <a:ext cx="6088698" cy="6858002"/>
-          </a:xfrm>
-          <a:custGeom>
-            <a:avLst/>
-            <a:gdLst>
-              <a:gd name="connsiteX0" fmla="*/ 0 w 6088698"/>
-              <a:gd name="connsiteY0" fmla="*/ 0 h 6858002"/>
-              <a:gd name="connsiteX1" fmla="*/ 2610464 w 6088698"/>
-              <a:gd name="connsiteY1" fmla="*/ 0 h 6858002"/>
-              <a:gd name="connsiteX2" fmla="*/ 2610464 w 6088698"/>
-              <a:gd name="connsiteY2" fmla="*/ 3 h 6858002"/>
-              <a:gd name="connsiteX3" fmla="*/ 5749313 w 6088698"/>
-              <a:gd name="connsiteY3" fmla="*/ 3 h 6858002"/>
-              <a:gd name="connsiteX4" fmla="*/ 5749313 w 6088698"/>
-              <a:gd name="connsiteY4" fmla="*/ 4 h 6858002"/>
-              <a:gd name="connsiteX5" fmla="*/ 5740011 w 6088698"/>
-              <a:gd name="connsiteY5" fmla="*/ 4 h 6858002"/>
-              <a:gd name="connsiteX6" fmla="*/ 5748114 w 6088698"/>
-              <a:gd name="connsiteY6" fmla="*/ 40466 h 6858002"/>
-              <a:gd name="connsiteX7" fmla="*/ 5771963 w 6088698"/>
-              <a:gd name="connsiteY7" fmla="*/ 159110 h 6858002"/>
-              <a:gd name="connsiteX8" fmla="*/ 5788633 w 6088698"/>
-              <a:gd name="connsiteY8" fmla="*/ 245521 h 6858002"/>
-              <a:gd name="connsiteX9" fmla="*/ 5806229 w 6088698"/>
-              <a:gd name="connsiteY9" fmla="*/ 348391 h 6858002"/>
-              <a:gd name="connsiteX10" fmla="*/ 5827299 w 6088698"/>
-              <a:gd name="connsiteY10" fmla="*/ 470463 h 6858002"/>
-              <a:gd name="connsiteX11" fmla="*/ 5849526 w 6088698"/>
-              <a:gd name="connsiteY11" fmla="*/ 605566 h 6858002"/>
-              <a:gd name="connsiteX12" fmla="*/ 5872911 w 6088698"/>
-              <a:gd name="connsiteY12" fmla="*/ 757813 h 6858002"/>
-              <a:gd name="connsiteX13" fmla="*/ 5897684 w 6088698"/>
-              <a:gd name="connsiteY13" fmla="*/ 923777 h 6858002"/>
-              <a:gd name="connsiteX14" fmla="*/ 5922459 w 6088698"/>
-              <a:gd name="connsiteY14" fmla="*/ 1104142 h 6858002"/>
-              <a:gd name="connsiteX15" fmla="*/ 5947695 w 6088698"/>
-              <a:gd name="connsiteY15" fmla="*/ 1296166 h 6858002"/>
-              <a:gd name="connsiteX16" fmla="*/ 5971079 w 6088698"/>
-              <a:gd name="connsiteY16" fmla="*/ 1503278 h 6858002"/>
-              <a:gd name="connsiteX17" fmla="*/ 5993538 w 6088698"/>
-              <a:gd name="connsiteY17" fmla="*/ 1719991 h 6858002"/>
-              <a:gd name="connsiteX18" fmla="*/ 6013913 w 6088698"/>
-              <a:gd name="connsiteY18" fmla="*/ 1949048 h 6858002"/>
-              <a:gd name="connsiteX19" fmla="*/ 6033361 w 6088698"/>
-              <a:gd name="connsiteY19" fmla="*/ 2187706 h 6858002"/>
-              <a:gd name="connsiteX20" fmla="*/ 6051654 w 6088698"/>
-              <a:gd name="connsiteY20" fmla="*/ 2436652 h 6858002"/>
-              <a:gd name="connsiteX21" fmla="*/ 6058136 w 6088698"/>
-              <a:gd name="connsiteY21" fmla="*/ 2564211 h 6858002"/>
-              <a:gd name="connsiteX22" fmla="*/ 6065314 w 6088698"/>
-              <a:gd name="connsiteY22" fmla="*/ 2694512 h 6858002"/>
-              <a:gd name="connsiteX23" fmla="*/ 6072027 w 6088698"/>
-              <a:gd name="connsiteY23" fmla="*/ 2826871 h 6858002"/>
-              <a:gd name="connsiteX24" fmla="*/ 6076427 w 6088698"/>
-              <a:gd name="connsiteY24" fmla="*/ 2959917 h 6858002"/>
-              <a:gd name="connsiteX25" fmla="*/ 6080363 w 6088698"/>
-              <a:gd name="connsiteY25" fmla="*/ 3095705 h 6858002"/>
-              <a:gd name="connsiteX26" fmla="*/ 6084530 w 6088698"/>
-              <a:gd name="connsiteY26" fmla="*/ 3232865 h 6858002"/>
-              <a:gd name="connsiteX27" fmla="*/ 6087308 w 6088698"/>
-              <a:gd name="connsiteY27" fmla="*/ 3372768 h 6858002"/>
-              <a:gd name="connsiteX28" fmla="*/ 6087308 w 6088698"/>
-              <a:gd name="connsiteY28" fmla="*/ 3514043 h 6858002"/>
-              <a:gd name="connsiteX29" fmla="*/ 6088698 w 6088698"/>
-              <a:gd name="connsiteY29" fmla="*/ 3656689 h 6858002"/>
-              <a:gd name="connsiteX30" fmla="*/ 6087308 w 6088698"/>
-              <a:gd name="connsiteY30" fmla="*/ 3800707 h 6858002"/>
-              <a:gd name="connsiteX31" fmla="*/ 6084530 w 6088698"/>
-              <a:gd name="connsiteY31" fmla="*/ 3946783 h 6858002"/>
-              <a:gd name="connsiteX32" fmla="*/ 6081983 w 6088698"/>
-              <a:gd name="connsiteY32" fmla="*/ 4092858 h 6858002"/>
-              <a:gd name="connsiteX33" fmla="*/ 6076427 w 6088698"/>
-              <a:gd name="connsiteY33" fmla="*/ 4240991 h 6858002"/>
-              <a:gd name="connsiteX34" fmla="*/ 6070639 w 6088698"/>
-              <a:gd name="connsiteY34" fmla="*/ 4390495 h 6858002"/>
-              <a:gd name="connsiteX35" fmla="*/ 6063924 w 6088698"/>
-              <a:gd name="connsiteY35" fmla="*/ 4540000 h 6858002"/>
-              <a:gd name="connsiteX36" fmla="*/ 6054432 w 6088698"/>
-              <a:gd name="connsiteY36" fmla="*/ 4690876 h 6858002"/>
-              <a:gd name="connsiteX37" fmla="*/ 6043086 w 6088698"/>
-              <a:gd name="connsiteY37" fmla="*/ 4843123 h 6858002"/>
-              <a:gd name="connsiteX38" fmla="*/ 6032204 w 6088698"/>
-              <a:gd name="connsiteY38" fmla="*/ 4996057 h 6858002"/>
-              <a:gd name="connsiteX39" fmla="*/ 6018313 w 6088698"/>
-              <a:gd name="connsiteY39" fmla="*/ 5148990 h 6858002"/>
-              <a:gd name="connsiteX40" fmla="*/ 6001642 w 6088698"/>
-              <a:gd name="connsiteY40" fmla="*/ 5303981 h 6858002"/>
-              <a:gd name="connsiteX41" fmla="*/ 5984972 w 6088698"/>
-              <a:gd name="connsiteY41" fmla="*/ 5456914 h 6858002"/>
-              <a:gd name="connsiteX42" fmla="*/ 5965754 w 6088698"/>
-              <a:gd name="connsiteY42" fmla="*/ 5612591 h 6858002"/>
-              <a:gd name="connsiteX43" fmla="*/ 5944685 w 6088698"/>
-              <a:gd name="connsiteY43" fmla="*/ 5768953 h 6858002"/>
-              <a:gd name="connsiteX44" fmla="*/ 5922459 w 6088698"/>
-              <a:gd name="connsiteY44" fmla="*/ 5923258 h 6858002"/>
-              <a:gd name="connsiteX45" fmla="*/ 5896527 w 6088698"/>
-              <a:gd name="connsiteY45" fmla="*/ 6079621 h 6858002"/>
-              <a:gd name="connsiteX46" fmla="*/ 5868743 w 6088698"/>
-              <a:gd name="connsiteY46" fmla="*/ 6235297 h 6858002"/>
-              <a:gd name="connsiteX47" fmla="*/ 5841190 w 6088698"/>
-              <a:gd name="connsiteY47" fmla="*/ 6391660 h 6858002"/>
-              <a:gd name="connsiteX48" fmla="*/ 5809008 w 6088698"/>
-              <a:gd name="connsiteY48" fmla="*/ 6547336 h 6858002"/>
-              <a:gd name="connsiteX49" fmla="*/ 5776130 w 6088698"/>
-              <a:gd name="connsiteY49" fmla="*/ 6702327 h 6858002"/>
-              <a:gd name="connsiteX50" fmla="*/ 5741633 w 6088698"/>
-              <a:gd name="connsiteY50" fmla="*/ 6858002 h 6858002"/>
-              <a:gd name="connsiteX51" fmla="*/ 2610464 w 6088698"/>
-              <a:gd name="connsiteY51" fmla="*/ 6858002 h 6858002"/>
-              <a:gd name="connsiteX52" fmla="*/ 0 w 6088698"/>
-              <a:gd name="connsiteY52" fmla="*/ 6858002 h 6858002"/>
-            </a:gdLst>
-            <a:ahLst/>
-            <a:cxnLst>
-              <a:cxn ang="0">
-                <a:pos x="connsiteX0" y="connsiteY0"/>
-              </a:cxn>
-              <a:cxn ang="0">
-                <a:pos x="connsiteX1" y="connsiteY1"/>
-              </a:cxn>
-              <a:cxn ang="0">
-                <a:pos x="connsiteX2" y="connsiteY2"/>
-              </a:cxn>
-              <a:cxn ang="0">
-                <a:pos x="connsiteX3" y="connsiteY3"/>
-              </a:cxn>
-              <a:cxn ang="0">
-                <a:pos x="connsiteX4" y="connsiteY4"/>
-              </a:cxn>
-              <a:cxn ang="0">
-                <a:pos x="connsiteX5" y="connsiteY5"/>
-              </a:cxn>
-              <a:cxn ang="0">
-                <a:pos x="connsiteX6" y="connsiteY6"/>
-              </a:cxn>
-              <a:cxn ang="0">
-                <a:pos x="connsiteX7" y="connsiteY7"/>
-              </a:cxn>
-              <a:cxn ang="0">
-                <a:pos x="connsiteX8" y="connsiteY8"/>
-              </a:cxn>
-              <a:cxn ang="0">
-                <a:pos x="connsiteX9" y="connsiteY9"/>
-              </a:cxn>
-              <a:cxn ang="0">
-                <a:pos x="connsiteX10" y="connsiteY10"/>
-              </a:cxn>
-              <a:cxn ang="0">
-                <a:pos x="connsiteX11" y="connsiteY11"/>
-              </a:cxn>
-              <a:cxn ang="0">
-                <a:pos x="connsiteX12" y="connsiteY12"/>
-              </a:cxn>
-              <a:cxn ang="0">
-                <a:pos x="connsiteX13" y="connsiteY13"/>
-              </a:cxn>
-              <a:cxn ang="0">
-                <a:pos x="connsiteX14" y="connsiteY14"/>
-              </a:cxn>
-              <a:cxn ang="0">
-                <a:pos x="connsiteX15" y="connsiteY15"/>
-              </a:cxn>
-              <a:cxn ang="0">
-                <a:pos x="connsiteX16" y="connsiteY16"/>
-              </a:cxn>
-              <a:cxn ang="0">
-                <a:pos x="connsiteX17" y="connsiteY17"/>
-              </a:cxn>
-              <a:cxn ang="0">
-                <a:pos x="connsiteX18" y="connsiteY18"/>
-              </a:cxn>
-              <a:cxn ang="0">
-                <a:pos x="connsiteX19" y="connsiteY19"/>
-              </a:cxn>
-              <a:cxn ang="0">
-                <a:pos x="connsiteX20" y="connsiteY20"/>
-              </a:cxn>
-              <a:cxn ang="0">
-                <a:pos x="connsiteX21" y="connsiteY21"/>
-              </a:cxn>
-              <a:cxn ang="0">
-                <a:pos x="connsiteX22" y="connsiteY22"/>
-              </a:cxn>
-              <a:cxn ang="0">
-                <a:pos x="connsiteX23" y="connsiteY23"/>
-              </a:cxn>
-              <a:cxn ang="0">
-                <a:pos x="connsiteX24" y="connsiteY24"/>
-              </a:cxn>
-              <a:cxn ang="0">
-                <a:pos x="connsiteX25" y="connsiteY25"/>
-              </a:cxn>
-              <a:cxn ang="0">
-                <a:pos x="connsiteX26" y="connsiteY26"/>
-              </a:cxn>
-              <a:cxn ang="0">
-                <a:pos x="connsiteX27" y="connsiteY27"/>
-              </a:cxn>
-              <a:cxn ang="0">
-                <a:pos x="connsiteX28" y="connsiteY28"/>
-              </a:cxn>
-              <a:cxn ang="0">
-                <a:pos x="connsiteX29" y="connsiteY29"/>
-              </a:cxn>
-              <a:cxn ang="0">
-                <a:pos x="connsiteX30" y="connsiteY30"/>
-              </a:cxn>
-              <a:cxn ang="0">
-                <a:pos x="connsiteX31" y="connsiteY31"/>
-              </a:cxn>
-              <a:cxn ang="0">
-                <a:pos x="connsiteX32" y="connsiteY32"/>
-              </a:cxn>
-              <a:cxn ang="0">
-                <a:pos x="connsiteX33" y="connsiteY33"/>
-              </a:cxn>
-              <a:cxn ang="0">
-                <a:pos x="connsiteX34" y="connsiteY34"/>
-              </a:cxn>
-              <a:cxn ang="0">
-                <a:pos x="connsiteX35" y="connsiteY35"/>
-              </a:cxn>
-              <a:cxn ang="0">
-                <a:pos x="connsiteX36" y="connsiteY36"/>
-              </a:cxn>
-              <a:cxn ang="0">
-                <a:pos x="connsiteX37" y="connsiteY37"/>
-              </a:cxn>
-              <a:cxn ang="0">
-                <a:pos x="connsiteX38" y="connsiteY38"/>
-              </a:cxn>
-              <a:cxn ang="0">
-                <a:pos x="connsiteX39" y="connsiteY39"/>
-              </a:cxn>
-              <a:cxn ang="0">
-                <a:pos x="connsiteX40" y="connsiteY40"/>
-              </a:cxn>
-              <a:cxn ang="0">
-                <a:pos x="connsiteX41" y="connsiteY41"/>
-              </a:cxn>
-              <a:cxn ang="0">
-                <a:pos x="connsiteX42" y="connsiteY42"/>
-              </a:cxn>
-              <a:cxn ang="0">
-                <a:pos x="connsiteX43" y="connsiteY43"/>
-              </a:cxn>
-              <a:cxn ang="0">
-                <a:pos x="connsiteX44" y="connsiteY44"/>
-              </a:cxn>
-              <a:cxn ang="0">
-                <a:pos x="connsiteX45" y="connsiteY45"/>
-              </a:cxn>
-              <a:cxn ang="0">
-                <a:pos x="connsiteX46" y="connsiteY46"/>
-              </a:cxn>
-              <a:cxn ang="0">
-                <a:pos x="connsiteX47" y="connsiteY47"/>
-              </a:cxn>
-              <a:cxn ang="0">
-                <a:pos x="connsiteX48" y="connsiteY48"/>
-              </a:cxn>
-              <a:cxn ang="0">
-                <a:pos x="connsiteX49" y="connsiteY49"/>
-              </a:cxn>
-              <a:cxn ang="0">
-                <a:pos x="connsiteX50" y="connsiteY50"/>
-              </a:cxn>
-              <a:cxn ang="0">
-                <a:pos x="connsiteX51" y="connsiteY51"/>
-              </a:cxn>
-              <a:cxn ang="0">
-                <a:pos x="connsiteX52" y="connsiteY52"/>
-              </a:cxn>
-            </a:cxnLst>
-            <a:rect l="l" t="t" r="r" b="b"/>
-            <a:pathLst>
-              <a:path w="6088698" h="6858002">
-                <a:moveTo>
-                  <a:pt x="0" y="0"/>
-                </a:moveTo>
-                <a:lnTo>
-                  <a:pt x="2610464" y="0"/>
-                </a:lnTo>
-                <a:lnTo>
-                  <a:pt x="2610464" y="3"/>
-                </a:lnTo>
-                <a:lnTo>
-                  <a:pt x="5749313" y="3"/>
-                </a:lnTo>
-                <a:lnTo>
-                  <a:pt x="5749313" y="4"/>
-                </a:lnTo>
-                <a:lnTo>
-                  <a:pt x="5740011" y="4"/>
-                </a:lnTo>
-                <a:lnTo>
-                  <a:pt x="5748114" y="40466"/>
-                </a:lnTo>
-                <a:lnTo>
-                  <a:pt x="5771963" y="159110"/>
-                </a:lnTo>
-                <a:lnTo>
-                  <a:pt x="5788633" y="245521"/>
-                </a:lnTo>
-                <a:lnTo>
-                  <a:pt x="5806229" y="348391"/>
-                </a:lnTo>
-                <a:lnTo>
-                  <a:pt x="5827299" y="470463"/>
-                </a:lnTo>
-                <a:lnTo>
-                  <a:pt x="5849526" y="605566"/>
-                </a:lnTo>
-                <a:lnTo>
-                  <a:pt x="5872911" y="757813"/>
-                </a:lnTo>
-                <a:lnTo>
-                  <a:pt x="5897684" y="923777"/>
-                </a:lnTo>
-                <a:lnTo>
-                  <a:pt x="5922459" y="1104142"/>
-                </a:lnTo>
-                <a:lnTo>
-                  <a:pt x="5947695" y="1296166"/>
-                </a:lnTo>
-                <a:lnTo>
-                  <a:pt x="5971079" y="1503278"/>
-                </a:lnTo>
-                <a:lnTo>
-                  <a:pt x="5993538" y="1719991"/>
-                </a:lnTo>
-                <a:lnTo>
-                  <a:pt x="6013913" y="1949048"/>
-                </a:lnTo>
-                <a:lnTo>
-                  <a:pt x="6033361" y="2187706"/>
-                </a:lnTo>
-                <a:lnTo>
-                  <a:pt x="6051654" y="2436652"/>
-                </a:lnTo>
-                <a:lnTo>
-                  <a:pt x="6058136" y="2564211"/>
-                </a:lnTo>
-                <a:lnTo>
-                  <a:pt x="6065314" y="2694512"/>
-                </a:lnTo>
-                <a:lnTo>
-                  <a:pt x="6072027" y="2826871"/>
-                </a:lnTo>
-                <a:lnTo>
-                  <a:pt x="6076427" y="2959917"/>
-                </a:lnTo>
-                <a:lnTo>
-                  <a:pt x="6080363" y="3095705"/>
-                </a:lnTo>
-                <a:lnTo>
-                  <a:pt x="6084530" y="3232865"/>
-                </a:lnTo>
-                <a:lnTo>
-                  <a:pt x="6087308" y="3372768"/>
-                </a:lnTo>
-                <a:lnTo>
-                  <a:pt x="6087308" y="3514043"/>
-                </a:lnTo>
-                <a:lnTo>
-                  <a:pt x="6088698" y="3656689"/>
-                </a:lnTo>
-                <a:lnTo>
-                  <a:pt x="6087308" y="3800707"/>
-                </a:lnTo>
-                <a:lnTo>
-                  <a:pt x="6084530" y="3946783"/>
-                </a:lnTo>
-                <a:lnTo>
-                  <a:pt x="6081983" y="4092858"/>
-                </a:lnTo>
-                <a:lnTo>
-                  <a:pt x="6076427" y="4240991"/>
-                </a:lnTo>
-                <a:lnTo>
-                  <a:pt x="6070639" y="4390495"/>
-                </a:lnTo>
-                <a:lnTo>
-                  <a:pt x="6063924" y="4540000"/>
-                </a:lnTo>
-                <a:lnTo>
-                  <a:pt x="6054432" y="4690876"/>
-                </a:lnTo>
-                <a:lnTo>
-                  <a:pt x="6043086" y="4843123"/>
-                </a:lnTo>
-                <a:lnTo>
-                  <a:pt x="6032204" y="4996057"/>
-                </a:lnTo>
-                <a:lnTo>
-                  <a:pt x="6018313" y="5148990"/>
-                </a:lnTo>
-                <a:lnTo>
-                  <a:pt x="6001642" y="5303981"/>
-                </a:lnTo>
-                <a:lnTo>
-                  <a:pt x="5984972" y="5456914"/>
-                </a:lnTo>
-                <a:lnTo>
-                  <a:pt x="5965754" y="5612591"/>
-                </a:lnTo>
-                <a:lnTo>
-                  <a:pt x="5944685" y="5768953"/>
-                </a:lnTo>
-                <a:lnTo>
-                  <a:pt x="5922459" y="5923258"/>
-                </a:lnTo>
-                <a:lnTo>
-                  <a:pt x="5896527" y="6079621"/>
-                </a:lnTo>
-                <a:lnTo>
-                  <a:pt x="5868743" y="6235297"/>
-                </a:lnTo>
-                <a:lnTo>
-                  <a:pt x="5841190" y="6391660"/>
-                </a:lnTo>
-                <a:lnTo>
-                  <a:pt x="5809008" y="6547336"/>
-                </a:lnTo>
-                <a:lnTo>
-                  <a:pt x="5776130" y="6702327"/>
-                </a:lnTo>
-                <a:lnTo>
-                  <a:pt x="5741633" y="6858002"/>
-                </a:lnTo>
-                <a:lnTo>
-                  <a:pt x="2610464" y="6858002"/>
-                </a:lnTo>
-                <a:lnTo>
-                  <a:pt x="0" y="6858002"/>
-                </a:lnTo>
-                <a:close/>
-              </a:path>
-            </a:pathLst>
-          </a:custGeom>
-          <a:ln>
-            <a:noFill/>
-          </a:ln>
-          <a:effectLst>
-            <a:outerShdw blurRad="50800" dist="38100" algn="l" rotWithShape="0">
-              <a:prstClr val="black">
-                <a:alpha val="40000"/>
-              </a:prstClr>
-            </a:outerShdw>
-          </a:effectLst>
-        </p:spPr>
-        <p:style>
-          <a:lnRef idx="2">
-            <a:schemeClr val="accent1">
-              <a:shade val="50000"/>
-            </a:schemeClr>
-          </a:lnRef>
-          <a:fillRef idx="1">
-            <a:schemeClr val="accent1"/>
-          </a:fillRef>
-          <a:effectRef idx="0">
-            <a:schemeClr val="accent1"/>
-          </a:effectRef>
-          <a:fontRef idx="minor">
-            <a:schemeClr val="lt1"/>
-          </a:fontRef>
-        </p:style>
-        <p:txBody>
-          <a:bodyPr wrap="square" rtlCol="0" anchor="ctr">
-            <a:noAutofit/>
-          </a:bodyPr>
-          <a:lstStyle/>
-          <a:p>
-            <a:pPr algn="ctr"/>
-            <a:endParaRPr lang="en-US"/>
-          </a:p>
-        </p:txBody>
-      </p:sp>
-      <p:sp>
-        <p:nvSpPr>
-          <p:cNvPr id="2" name="Title 1">
-            <a:extLst>
-              <a:ext uri="{FF2B5EF4-FFF2-40B4-BE49-F238E27FC236}">
-                <a16:creationId xmlns:a16="http://schemas.microsoft.com/office/drawing/2014/main" id="{331428AD-72F4-4F1B-9735-19B145FD4940}"/>
-              </a:ext>
-            </a:extLst>
-          </p:cNvPr>
-          <p:cNvSpPr>
-            <a:spLocks noGrp="1"/>
-          </p:cNvSpPr>
-          <p:nvPr>
-            <p:ph type="title"/>
-          </p:nvPr>
-        </p:nvSpPr>
-        <p:spPr>
-          <a:xfrm>
-            <a:off x="900506" y="1118808"/>
-            <a:ext cx="4671467" cy="4747683"/>
-          </a:xfrm>
-        </p:spPr>
-        <p:txBody>
-          <a:bodyPr anchor="ctr">
-            <a:normAutofit/>
-          </a:bodyPr>
-          <a:lstStyle/>
-          <a:p>
-            <a:pPr algn="l"/>
-            <a:endParaRPr lang="en-GB" sz="4800"/>
           </a:p>
         </p:txBody>
       </p:sp>
@@ -13160,7 +12923,7 @@
         <p:spPr>
           <a:xfrm>
             <a:off x="6498769" y="1118809"/>
-            <a:ext cx="5049763" cy="4747681"/>
+            <a:ext cx="5049763" cy="5630053"/>
           </a:xfrm>
           <a:effectLst/>
         </p:spPr>
@@ -13169,6 +12932,16 @@
             <a:normAutofit/>
           </a:bodyPr>
           <a:lstStyle/>
+          <a:p>
+            <a:r>
+              <a:rPr lang="en-GB" dirty="0">
+                <a:solidFill>
+                  <a:schemeClr val="tx1"/>
+                </a:solidFill>
+              </a:rPr>
+              <a:t>Texture optimization</a:t>
+            </a:r>
+          </a:p>
           <a:p>
             <a:endParaRPr lang="en-GB" dirty="0">
               <a:solidFill>
@@ -13176,8 +12949,120 @@
               </a:solidFill>
             </a:endParaRPr>
           </a:p>
-        </p:txBody>
-      </p:sp>
+          <a:p>
+            <a:r>
+              <a:rPr lang="en-GB" dirty="0">
+                <a:solidFill>
+                  <a:schemeClr val="tx1"/>
+                </a:solidFill>
+              </a:rPr>
+              <a:t>Lighting:</a:t>
+            </a:r>
+          </a:p>
+          <a:p>
+            <a:pPr lvl="1"/>
+            <a:r>
+              <a:rPr lang="en-GB" dirty="0">
+                <a:solidFill>
+                  <a:schemeClr val="tx1"/>
+                </a:solidFill>
+              </a:rPr>
+              <a:t>Shadows on objects</a:t>
+            </a:r>
+          </a:p>
+          <a:p>
+            <a:pPr lvl="1"/>
+            <a:r>
+              <a:rPr lang="en-GB" dirty="0">
+                <a:solidFill>
+                  <a:schemeClr val="tx1"/>
+                </a:solidFill>
+              </a:rPr>
+              <a:t>Main sun disk</a:t>
+            </a:r>
+          </a:p>
+          <a:p>
+            <a:pPr lvl="1"/>
+            <a:endParaRPr lang="en-GB" dirty="0">
+              <a:solidFill>
+                <a:schemeClr val="tx1"/>
+              </a:solidFill>
+            </a:endParaRPr>
+          </a:p>
+          <a:p>
+            <a:r>
+              <a:rPr lang="en-GB" dirty="0">
+                <a:solidFill>
+                  <a:schemeClr val="tx1"/>
+                </a:solidFill>
+              </a:rPr>
+              <a:t>Score gets called twice and duplicates score</a:t>
+            </a:r>
+          </a:p>
+          <a:p>
+            <a:r>
+              <a:rPr lang="en-GB" dirty="0">
+                <a:solidFill>
+                  <a:schemeClr val="tx1"/>
+                </a:solidFill>
+              </a:rPr>
+              <a:t>Pong Mini Game:</a:t>
+            </a:r>
+          </a:p>
+          <a:p>
+            <a:pPr lvl="1"/>
+            <a:r>
+              <a:rPr lang="en-GB" dirty="0">
+                <a:solidFill>
+                  <a:schemeClr val="tx1"/>
+                </a:solidFill>
+              </a:rPr>
+              <a:t>Ball did not move 45 degrees all the time</a:t>
+            </a:r>
+          </a:p>
+          <a:p>
+            <a:pPr lvl="1"/>
+            <a:r>
+              <a:rPr lang="en-GB" dirty="0">
+                <a:solidFill>
+                  <a:schemeClr val="tx1"/>
+                </a:solidFill>
+              </a:rPr>
+              <a:t>RigidBody movement updates 2 times/s while Update(){} does it every frame (movement issue)</a:t>
+            </a:r>
+          </a:p>
+        </p:txBody>
+      </p:sp>
+      <p:pic>
+        <p:nvPicPr>
+          <p:cNvPr id="4" name="Picture 3">
+            <a:extLst>
+              <a:ext uri="{FF2B5EF4-FFF2-40B4-BE49-F238E27FC236}">
+                <a16:creationId xmlns:a16="http://schemas.microsoft.com/office/drawing/2014/main" id="{BDA3C341-3DB7-42AE-AEA9-98DCD2A276ED}"/>
+              </a:ext>
+            </a:extLst>
+          </p:cNvPr>
+          <p:cNvPicPr>
+            <a:picLocks noChangeAspect="1"/>
+          </p:cNvPicPr>
+          <p:nvPr/>
+        </p:nvPicPr>
+        <p:blipFill>
+          <a:blip r:embed="rId3"/>
+          <a:stretch>
+            <a:fillRect/>
+          </a:stretch>
+        </p:blipFill>
+        <p:spPr>
+          <a:xfrm>
+            <a:off x="602198" y="8849"/>
+            <a:ext cx="10506205" cy="6858000"/>
+          </a:xfrm>
+          <a:prstGeom prst="rect">
+            <a:avLst/>
+          </a:prstGeom>
+        </p:spPr>
+      </p:pic>
     </p:spTree>
     <p:extLst>
       <p:ext uri="{BB962C8B-B14F-4D97-AF65-F5344CB8AC3E}">
@@ -13188,6 +13073,89 @@
   <p:clrMapOvr>
     <a:masterClrMapping/>
   </p:clrMapOvr>
+  <p:timing>
+    <p:tnLst>
+      <p:par>
+        <p:cTn id="1" dur="indefinite" restart="never" nodeType="tmRoot">
+          <p:childTnLst>
+            <p:seq concurrent="1" nextAc="seek">
+              <p:cTn id="2" dur="indefinite" nodeType="mainSeq">
+                <p:childTnLst>
+                  <p:par>
+                    <p:cTn id="3" fill="hold">
+                      <p:stCondLst>
+                        <p:cond delay="indefinite"/>
+                      </p:stCondLst>
+                      <p:childTnLst>
+                        <p:par>
+                          <p:cTn id="4" fill="hold">
+                            <p:stCondLst>
+                              <p:cond delay="0"/>
+                            </p:stCondLst>
+                            <p:childTnLst>
+                              <p:par>
+                                <p:cTn id="5" presetID="10" presetClass="entr" presetSubtype="0" fill="hold" nodeType="clickEffect">
+                                  <p:stCondLst>
+                                    <p:cond delay="0"/>
+                                  </p:stCondLst>
+                                  <p:childTnLst>
+                                    <p:set>
+                                      <p:cBhvr>
+                                        <p:cTn id="6" dur="1" fill="hold">
+                                          <p:stCondLst>
+                                            <p:cond delay="0"/>
+                                          </p:stCondLst>
+                                        </p:cTn>
+                                        <p:tgtEl>
+                                          <p:spTgt spid="4"/>
+                                        </p:tgtEl>
+                                        <p:attrNameLst>
+                                          <p:attrName>style.visibility</p:attrName>
+                                        </p:attrNameLst>
+                                      </p:cBhvr>
+                                      <p:to>
+                                        <p:strVal val="visible"/>
+                                      </p:to>
+                                    </p:set>
+                                    <p:animEffect transition="in" filter="fade">
+                                      <p:cBhvr>
+                                        <p:cTn id="7" dur="500"/>
+                                        <p:tgtEl>
+                                          <p:spTgt spid="4"/>
+                                        </p:tgtEl>
+                                      </p:cBhvr>
+                                    </p:animEffect>
+                                  </p:childTnLst>
+                                </p:cTn>
+                              </p:par>
+                            </p:childTnLst>
+                          </p:cTn>
+                        </p:par>
+                      </p:childTnLst>
+                    </p:cTn>
+                  </p:par>
+                </p:childTnLst>
+              </p:cTn>
+              <p:prevCondLst>
+                <p:cond evt="onPrev" delay="0">
+                  <p:tgtEl>
+                    <p:sldTgt/>
+                  </p:tgtEl>
+                </p:cond>
+              </p:prevCondLst>
+              <p:nextCondLst>
+                <p:cond evt="onNext" delay="0">
+                  <p:tgtEl>
+                    <p:sldTgt/>
+                  </p:tgtEl>
+                </p:cond>
+              </p:nextCondLst>
+            </p:seq>
+          </p:childTnLst>
+        </p:cTn>
+      </p:par>
+    </p:tnLst>
+  </p:timing>
 </p:sld>
 </file>
 

</xml_diff>